<commit_message>
Fix title of page
</commit_message>
<xml_diff>
--- a/Presentation/Mechatron_Presentation.pptx
+++ b/Presentation/Mechatron_Presentation.pptx
@@ -1153,7 +1153,7 @@
           <a:p>
             <a:fld id="{1CA5457B-CDAE-4DEB-AEC8-C82DE2312E37}" type="datetimeFigureOut">
               <a:rPr lang="en-US" smtClean="0"/>
-              <a:t>3/31/2024</a:t>
+              <a:t>4/1/2024</a:t>
             </a:fld>
             <a:endParaRPr lang="en-US" dirty="0"/>
           </a:p>
@@ -1330,7 +1330,7 @@
           <a:p>
             <a:fld id="{090B78EA-28CE-41D8-9043-90E391E5F567}" type="datetimeFigureOut">
               <a:rPr lang="en-US" noProof="0" smtClean="0"/>
-              <a:t>3/31/2024</a:t>
+              <a:t>4/1/2024</a:t>
             </a:fld>
             <a:endParaRPr lang="en-US" noProof="0" dirty="0"/>
           </a:p>
@@ -27977,7 +27977,7 @@
           <a:p>
             <a:r>
               <a:rPr lang="en-US" dirty="0"/>
-              <a:t>Table</a:t>
+              <a:t>Division of Labor</a:t>
             </a:r>
           </a:p>
         </p:txBody>
@@ -30890,23 +30890,6 @@
 </file>
 
 <file path=customXml/item1.xml><?xml version="1.0" encoding="utf-8"?>
-<p:properties xmlns:p="http://schemas.microsoft.com/office/2006/metadata/properties" xmlns:xsi="http://www.w3.org/2001/XMLSchema-instance" xmlns:pc="http://schemas.microsoft.com/office/infopath/2007/PartnerControls">
-  <documentManagement>
-    <MediaServiceKeyPoints xmlns="71af3243-3dd4-4a8d-8c0d-dd76da1f02a5" xsi:nil="true"/>
-  </documentManagement>
-</p:properties>
-</file>
-
-<file path=customXml/item2.xml><?xml version="1.0" encoding="utf-8"?>
-<?mso-contentType ?>
-<FormTemplates xmlns="http://schemas.microsoft.com/sharepoint/v3/contenttype/forms">
-  <Display>DocumentLibraryForm</Display>
-  <Edit>DocumentLibraryForm</Edit>
-  <New>DocumentLibraryForm</New>
-</FormTemplates>
-</file>
-
-<file path=customXml/item3.xml><?xml version="1.0" encoding="utf-8"?>
 <ct:contentTypeSchema xmlns:ct="http://schemas.microsoft.com/office/2006/metadata/contentType" xmlns:ma="http://schemas.microsoft.com/office/2006/metadata/properties/metaAttributes" ct:_="" ma:_="" ma:contentTypeName="Document" ma:contentTypeID="0x01010079F111ED35F8CC479449609E8A0923A6" ma:contentTypeVersion="11" ma:contentTypeDescription="Create a new document." ma:contentTypeScope="" ma:versionID="96291512c1ee715ab617f4c07df79fc1">
   <xsd:schema xmlns:xsd="http://www.w3.org/2001/XMLSchema" xmlns:xs="http://www.w3.org/2001/XMLSchema" xmlns:p="http://schemas.microsoft.com/office/2006/metadata/properties" xmlns:ns2="71af3243-3dd4-4a8d-8c0d-dd76da1f02a5" xmlns:ns3="16c05727-aa75-4e4a-9b5f-8a80a1165891" targetNamespace="http://schemas.microsoft.com/office/2006/metadata/properties" ma:root="true" ma:fieldsID="8256c27c40ca5c40ce1cf6c44f0205df" ns2:_="" ns3:_="">
     <xsd:import namespace="71af3243-3dd4-4a8d-8c0d-dd76da1f02a5"/>
@@ -31117,25 +31100,24 @@
 </ct:contentTypeSchema>
 </file>
 
-<file path=customXml/itemProps1.xml><?xml version="1.0" encoding="utf-8"?>
-<ds:datastoreItem xmlns:ds="http://schemas.openxmlformats.org/officeDocument/2006/customXml" ds:itemID="{F5757914-1161-4661-9696-421FD6935CDD}">
-  <ds:schemaRefs>
-    <ds:schemaRef ds:uri="http://schemas.microsoft.com/office/2006/metadata/properties"/>
-    <ds:schemaRef ds:uri="http://schemas.microsoft.com/office/infopath/2007/PartnerControls"/>
-    <ds:schemaRef ds:uri="71af3243-3dd4-4a8d-8c0d-dd76da1f02a5"/>
-  </ds:schemaRefs>
-</ds:datastoreItem>
+<file path=customXml/item2.xml><?xml version="1.0" encoding="utf-8"?>
+<?mso-contentType ?>
+<FormTemplates xmlns="http://schemas.microsoft.com/sharepoint/v3/contenttype/forms">
+  <Display>DocumentLibraryForm</Display>
+  <Edit>DocumentLibraryForm</Edit>
+  <New>DocumentLibraryForm</New>
+</FormTemplates>
 </file>
 
-<file path=customXml/itemProps2.xml><?xml version="1.0" encoding="utf-8"?>
-<ds:datastoreItem xmlns:ds="http://schemas.openxmlformats.org/officeDocument/2006/customXml" ds:itemID="{5B26E0C9-B2AA-42E6-97B6-E1B7D9EAF129}">
-  <ds:schemaRefs>
-    <ds:schemaRef ds:uri="http://schemas.microsoft.com/sharepoint/v3/contenttype/forms"/>
-  </ds:schemaRefs>
-</ds:datastoreItem>
+<file path=customXml/item3.xml><?xml version="1.0" encoding="utf-8"?>
+<p:properties xmlns:p="http://schemas.microsoft.com/office/2006/metadata/properties" xmlns:xsi="http://www.w3.org/2001/XMLSchema-instance" xmlns:pc="http://schemas.microsoft.com/office/infopath/2007/PartnerControls">
+  <documentManagement>
+    <MediaServiceKeyPoints xmlns="71af3243-3dd4-4a8d-8c0d-dd76da1f02a5" xsi:nil="true"/>
+  </documentManagement>
+</p:properties>
 </file>
 
-<file path=customXml/itemProps3.xml><?xml version="1.0" encoding="utf-8"?>
+<file path=customXml/itemProps1.xml><?xml version="1.0" encoding="utf-8"?>
 <ds:datastoreItem xmlns:ds="http://schemas.openxmlformats.org/officeDocument/2006/customXml" ds:itemID="{4C103400-4A22-4E35-B588-4C4D42638959}">
   <ds:schemaRefs>
     <ds:schemaRef ds:uri="http://schemas.microsoft.com/office/2006/metadata/contentType"/>
@@ -31152,4 +31134,22 @@
     <ds:schemaRef ds:uri="http://schemas.microsoft.com/internal/obd"/>
   </ds:schemaRefs>
 </ds:datastoreItem>
+</file>
+
+<file path=customXml/itemProps2.xml><?xml version="1.0" encoding="utf-8"?>
+<ds:datastoreItem xmlns:ds="http://schemas.openxmlformats.org/officeDocument/2006/customXml" ds:itemID="{5B26E0C9-B2AA-42E6-97B6-E1B7D9EAF129}">
+  <ds:schemaRefs>
+    <ds:schemaRef ds:uri="http://schemas.microsoft.com/sharepoint/v3/contenttype/forms"/>
+  </ds:schemaRefs>
+</ds:datastoreItem>
+</file>
+
+<file path=customXml/itemProps3.xml><?xml version="1.0" encoding="utf-8"?>
+<ds:datastoreItem xmlns:ds="http://schemas.openxmlformats.org/officeDocument/2006/customXml" ds:itemID="{F5757914-1161-4661-9696-421FD6935CDD}">
+  <ds:schemaRefs>
+    <ds:schemaRef ds:uri="http://schemas.microsoft.com/office/2006/metadata/properties"/>
+    <ds:schemaRef ds:uri="http://schemas.microsoft.com/office/infopath/2007/PartnerControls"/>
+    <ds:schemaRef ds:uri="71af3243-3dd4-4a8d-8c0d-dd76da1f02a5"/>
+  </ds:schemaRefs>
+</ds:datastoreItem>
 </file>
</xml_diff>